<commit_message>
continuer interface pour sprite 2 et modifier backlog pour sprint 2
</commit_message>
<xml_diff>
--- a/diagramme/interfaceSprite2.pptx
+++ b/diagramme/interfaceSprite2.pptx
@@ -108,6 +108,11 @@
       </a:defRPr>
     </a:lvl9pPr>
   </p:defaultTextStyle>
+  <p:extLst>
+    <p:ext uri="{EFAFB233-063F-42B5-8137-9DF3F51BA10A}">
+      <p15:sldGuideLst xmlns:p15="http://schemas.microsoft.com/office/powerpoint/2012/main"/>
+    </p:ext>
+  </p:extLst>
 </p:presentation>
 </file>
 
@@ -260,7 +265,7 @@
           <a:p>
             <a:fld id="{6E7D619A-527E-49AB-97BF-453A21F3C7D7}" type="datetimeFigureOut">
               <a:rPr lang="fr-CA" smtClean="0"/>
-              <a:t>2020-04-20</a:t>
+              <a:t>2020-04-21</a:t>
             </a:fld>
             <a:endParaRPr lang="fr-CA"/>
           </a:p>
@@ -460,7 +465,7 @@
           <a:p>
             <a:fld id="{6E7D619A-527E-49AB-97BF-453A21F3C7D7}" type="datetimeFigureOut">
               <a:rPr lang="fr-CA" smtClean="0"/>
-              <a:t>2020-04-20</a:t>
+              <a:t>2020-04-21</a:t>
             </a:fld>
             <a:endParaRPr lang="fr-CA"/>
           </a:p>
@@ -670,7 +675,7 @@
           <a:p>
             <a:fld id="{6E7D619A-527E-49AB-97BF-453A21F3C7D7}" type="datetimeFigureOut">
               <a:rPr lang="fr-CA" smtClean="0"/>
-              <a:t>2020-04-20</a:t>
+              <a:t>2020-04-21</a:t>
             </a:fld>
             <a:endParaRPr lang="fr-CA"/>
           </a:p>
@@ -870,7 +875,7 @@
           <a:p>
             <a:fld id="{6E7D619A-527E-49AB-97BF-453A21F3C7D7}" type="datetimeFigureOut">
               <a:rPr lang="fr-CA" smtClean="0"/>
-              <a:t>2020-04-20</a:t>
+              <a:t>2020-04-21</a:t>
             </a:fld>
             <a:endParaRPr lang="fr-CA"/>
           </a:p>
@@ -1146,7 +1151,7 @@
           <a:p>
             <a:fld id="{6E7D619A-527E-49AB-97BF-453A21F3C7D7}" type="datetimeFigureOut">
               <a:rPr lang="fr-CA" smtClean="0"/>
-              <a:t>2020-04-20</a:t>
+              <a:t>2020-04-21</a:t>
             </a:fld>
             <a:endParaRPr lang="fr-CA"/>
           </a:p>
@@ -1414,7 +1419,7 @@
           <a:p>
             <a:fld id="{6E7D619A-527E-49AB-97BF-453A21F3C7D7}" type="datetimeFigureOut">
               <a:rPr lang="fr-CA" smtClean="0"/>
-              <a:t>2020-04-20</a:t>
+              <a:t>2020-04-21</a:t>
             </a:fld>
             <a:endParaRPr lang="fr-CA"/>
           </a:p>
@@ -1829,7 +1834,7 @@
           <a:p>
             <a:fld id="{6E7D619A-527E-49AB-97BF-453A21F3C7D7}" type="datetimeFigureOut">
               <a:rPr lang="fr-CA" smtClean="0"/>
-              <a:t>2020-04-20</a:t>
+              <a:t>2020-04-21</a:t>
             </a:fld>
             <a:endParaRPr lang="fr-CA"/>
           </a:p>
@@ -1971,7 +1976,7 @@
           <a:p>
             <a:fld id="{6E7D619A-527E-49AB-97BF-453A21F3C7D7}" type="datetimeFigureOut">
               <a:rPr lang="fr-CA" smtClean="0"/>
-              <a:t>2020-04-20</a:t>
+              <a:t>2020-04-21</a:t>
             </a:fld>
             <a:endParaRPr lang="fr-CA"/>
           </a:p>
@@ -2084,7 +2089,7 @@
           <a:p>
             <a:fld id="{6E7D619A-527E-49AB-97BF-453A21F3C7D7}" type="datetimeFigureOut">
               <a:rPr lang="fr-CA" smtClean="0"/>
-              <a:t>2020-04-20</a:t>
+              <a:t>2020-04-21</a:t>
             </a:fld>
             <a:endParaRPr lang="fr-CA"/>
           </a:p>
@@ -2397,7 +2402,7 @@
           <a:p>
             <a:fld id="{6E7D619A-527E-49AB-97BF-453A21F3C7D7}" type="datetimeFigureOut">
               <a:rPr lang="fr-CA" smtClean="0"/>
-              <a:t>2020-04-20</a:t>
+              <a:t>2020-04-21</a:t>
             </a:fld>
             <a:endParaRPr lang="fr-CA"/>
           </a:p>
@@ -2686,7 +2691,7 @@
           <a:p>
             <a:fld id="{6E7D619A-527E-49AB-97BF-453A21F3C7D7}" type="datetimeFigureOut">
               <a:rPr lang="fr-CA" smtClean="0"/>
-              <a:t>2020-04-20</a:t>
+              <a:t>2020-04-21</a:t>
             </a:fld>
             <a:endParaRPr lang="fr-CA"/>
           </a:p>
@@ -2929,7 +2934,7 @@
           <a:p>
             <a:fld id="{6E7D619A-527E-49AB-97BF-453A21F3C7D7}" type="datetimeFigureOut">
               <a:rPr lang="fr-CA" smtClean="0"/>
-              <a:t>2020-04-20</a:t>
+              <a:t>2020-04-21</a:t>
             </a:fld>
             <a:endParaRPr lang="fr-CA"/>
           </a:p>
@@ -3468,8 +3473,8 @@
         </p:nvSpPr>
         <p:spPr>
           <a:xfrm>
-            <a:off x="1259687" y="182475"/>
-            <a:ext cx="5518618" cy="461665"/>
+            <a:off x="1259686" y="182475"/>
+            <a:ext cx="7968203" cy="1384995"/>
           </a:xfrm>
           <a:prstGeom prst="rect">
             <a:avLst/>
@@ -3486,6 +3491,13 @@
               <a:rPr lang="fr-CA" sz="2400" dirty="0"/>
               <a:t>Première interface: La page de connexion</a:t>
             </a:r>
+          </a:p>
+          <a:p>
+            <a:r>
+              <a:rPr lang="fr-CA" sz="2000" dirty="0"/>
+              <a:t>C’est la page où le client se connecte pour accéder au site. Il est obligatoire d’être connecter pour aller sur le site. Le site vérifie les données dans la BD et si tout est beau on est rediriger vers la page d’accueil.</a:t>
+            </a:r>
+            <a:endParaRPr lang="fr-CA" dirty="0"/>
           </a:p>
         </p:txBody>
       </p:sp>
@@ -3547,7 +3559,7 @@
         </p:blipFill>
         <p:spPr>
           <a:xfrm>
-            <a:off x="635347" y="1595419"/>
+            <a:off x="0" y="1477973"/>
             <a:ext cx="2609984" cy="4661140"/>
           </a:xfrm>
           <a:prstGeom prst="rect">
@@ -3557,10 +3569,10 @@
       </p:pic>
       <p:pic>
         <p:nvPicPr>
-          <p:cNvPr id="5" name="Image 4" descr="Une image contenant capture d’écran&#10;&#10;Description générée automatiquement">
-            <a:extLst>
-              <a:ext uri="{FF2B5EF4-FFF2-40B4-BE49-F238E27FC236}">
-                <a16:creationId xmlns:a16="http://schemas.microsoft.com/office/drawing/2014/main" id="{F6B78269-05D8-4868-92A3-AC8CB29B9363}"/>
+          <p:cNvPr id="7" name="Image 6" descr="Une image contenant capture d’écran&#10;&#10;Description générée automatiquement">
+            <a:extLst>
+              <a:ext uri="{FF2B5EF4-FFF2-40B4-BE49-F238E27FC236}">
+                <a16:creationId xmlns:a16="http://schemas.microsoft.com/office/drawing/2014/main" id="{60FC4F71-6238-48FE-843B-F1111E6830BE}"/>
               </a:ext>
             </a:extLst>
           </p:cNvPr>
@@ -3583,20 +3595,61 @@
         </p:blipFill>
         <p:spPr>
           <a:xfrm>
-            <a:off x="3395260" y="1893346"/>
-            <a:ext cx="2616334" cy="4648439"/>
+            <a:off x="5282895" y="2042309"/>
+            <a:ext cx="2622685" cy="4635738"/>
           </a:xfrm>
           <a:prstGeom prst="rect">
             <a:avLst/>
           </a:prstGeom>
         </p:spPr>
       </p:pic>
+      <p:sp>
+        <p:nvSpPr>
+          <p:cNvPr id="8" name="ZoneTexte 7">
+            <a:extLst>
+              <a:ext uri="{FF2B5EF4-FFF2-40B4-BE49-F238E27FC236}">
+                <a16:creationId xmlns:a16="http://schemas.microsoft.com/office/drawing/2014/main" id="{4A83A1C4-441D-49D8-9538-3CD35ECC5A79}"/>
+              </a:ext>
+            </a:extLst>
+          </p:cNvPr>
+          <p:cNvSpPr txBox="1"/>
+          <p:nvPr/>
+        </p:nvSpPr>
+        <p:spPr>
+          <a:xfrm>
+            <a:off x="1217741" y="0"/>
+            <a:ext cx="8765158" cy="1384995"/>
+          </a:xfrm>
+          <a:prstGeom prst="rect">
+            <a:avLst/>
+          </a:prstGeom>
+          <a:noFill/>
+        </p:spPr>
+        <p:txBody>
+          <a:bodyPr wrap="square" rtlCol="0">
+            <a:spAutoFit/>
+          </a:bodyPr>
+          <a:lstStyle/>
+          <a:p>
+            <a:r>
+              <a:rPr lang="fr-CA" sz="2400" dirty="0"/>
+              <a:t>Deuxième interface: La page d’accueil</a:t>
+            </a:r>
+          </a:p>
+          <a:p>
+            <a:r>
+              <a:rPr lang="fr-CA" sz="2000" dirty="0"/>
+              <a:t>C’est là qu’il y a toutes les informations de la commande. Les informations se mettent à jour automatiquement tout le long de la commande. Il est facile de naviguer sur la page en descendant ou en montant avec son doigt.</a:t>
+            </a:r>
+          </a:p>
+        </p:txBody>
+      </p:sp>
       <p:pic>
         <p:nvPicPr>
-          <p:cNvPr id="7" name="Image 6" descr="Une image contenant capture d’écran&#10;&#10;Description générée automatiquement">
-            <a:extLst>
-              <a:ext uri="{FF2B5EF4-FFF2-40B4-BE49-F238E27FC236}">
-                <a16:creationId xmlns:a16="http://schemas.microsoft.com/office/drawing/2014/main" id="{60FC4F71-6238-48FE-843B-F1111E6830BE}"/>
+          <p:cNvPr id="10" name="Image 9" descr="Une image contenant capture d’écran&#10;&#10;Description générée automatiquement">
+            <a:extLst>
+              <a:ext uri="{FF2B5EF4-FFF2-40B4-BE49-F238E27FC236}">
+                <a16:creationId xmlns:a16="http://schemas.microsoft.com/office/drawing/2014/main" id="{FB4A3AD2-B5BB-4013-85F0-79774F7D7D40}"/>
               </a:ext>
             </a:extLst>
           </p:cNvPr>
@@ -3619,61 +3672,20 @@
         </p:blipFill>
         <p:spPr>
           <a:xfrm>
-            <a:off x="6161523" y="2159755"/>
-            <a:ext cx="2622685" cy="4635738"/>
+            <a:off x="8013564" y="2042309"/>
+            <a:ext cx="2616334" cy="4635738"/>
           </a:xfrm>
           <a:prstGeom prst="rect">
             <a:avLst/>
           </a:prstGeom>
         </p:spPr>
       </p:pic>
-      <p:sp>
-        <p:nvSpPr>
-          <p:cNvPr id="8" name="ZoneTexte 7">
-            <a:extLst>
-              <a:ext uri="{FF2B5EF4-FFF2-40B4-BE49-F238E27FC236}">
-                <a16:creationId xmlns:a16="http://schemas.microsoft.com/office/drawing/2014/main" id="{4A83A1C4-441D-49D8-9538-3CD35ECC5A79}"/>
-              </a:ext>
-            </a:extLst>
-          </p:cNvPr>
-          <p:cNvSpPr txBox="1"/>
-          <p:nvPr/>
-        </p:nvSpPr>
-        <p:spPr>
-          <a:xfrm>
-            <a:off x="1217741" y="0"/>
-            <a:ext cx="8765158" cy="1384995"/>
-          </a:xfrm>
-          <a:prstGeom prst="rect">
-            <a:avLst/>
-          </a:prstGeom>
-          <a:noFill/>
-        </p:spPr>
-        <p:txBody>
-          <a:bodyPr wrap="square" rtlCol="0">
-            <a:spAutoFit/>
-          </a:bodyPr>
-          <a:lstStyle/>
-          <a:p>
-            <a:r>
-              <a:rPr lang="fr-CA" sz="2400" dirty="0"/>
-              <a:t>Deuxième interface: La page d’accueil (principale)</a:t>
-            </a:r>
-          </a:p>
-          <a:p>
-            <a:r>
-              <a:rPr lang="fr-CA" sz="2000" dirty="0"/>
-              <a:t>C’est là qu’il y a toutes les informations de la commande. Les informations se mettent à jour automatiquement tout le long de la commande. Il est facile de naviguer sur la page en descendant ou en montant avec son doigt.</a:t>
-            </a:r>
-          </a:p>
-        </p:txBody>
-      </p:sp>
       <p:pic>
         <p:nvPicPr>
-          <p:cNvPr id="10" name="Image 9" descr="Une image contenant capture d’écran&#10;&#10;Description générée automatiquement">
-            <a:extLst>
-              <a:ext uri="{FF2B5EF4-FFF2-40B4-BE49-F238E27FC236}">
-                <a16:creationId xmlns:a16="http://schemas.microsoft.com/office/drawing/2014/main" id="{FB4A3AD2-B5BB-4013-85F0-79774F7D7D40}"/>
+          <p:cNvPr id="4" name="Image 3" descr="Une image contenant capture d’écran&#10;&#10;Description générée automatiquement">
+            <a:extLst>
+              <a:ext uri="{FF2B5EF4-FFF2-40B4-BE49-F238E27FC236}">
+                <a16:creationId xmlns:a16="http://schemas.microsoft.com/office/drawing/2014/main" id="{0A3E8319-7523-4BE5-BBA0-1E67DE9EF769}"/>
               </a:ext>
             </a:extLst>
           </p:cNvPr>
@@ -3696,8 +3708,8 @@
         </p:blipFill>
         <p:spPr>
           <a:xfrm>
-            <a:off x="9009638" y="2159755"/>
-            <a:ext cx="2616334" cy="4635738"/>
+            <a:off x="10740093" y="0"/>
+            <a:ext cx="1451907" cy="6858000"/>
           </a:xfrm>
           <a:prstGeom prst="rect">
             <a:avLst/>
@@ -3706,10 +3718,10 @@
       </p:pic>
       <p:pic>
         <p:nvPicPr>
-          <p:cNvPr id="11" name="Image 10">
-            <a:extLst>
-              <a:ext uri="{FF2B5EF4-FFF2-40B4-BE49-F238E27FC236}">
-                <a16:creationId xmlns:a16="http://schemas.microsoft.com/office/drawing/2014/main" id="{8BC1EAF6-6399-4E52-BBA1-CDAE5F729E08}"/>
+          <p:cNvPr id="9" name="Image 8" descr="Une image contenant carte, texte, capture d’écran&#10;&#10;Description générée automatiquement">
+            <a:extLst>
+              <a:ext uri="{FF2B5EF4-FFF2-40B4-BE49-F238E27FC236}">
+                <a16:creationId xmlns:a16="http://schemas.microsoft.com/office/drawing/2014/main" id="{CCBD76E2-B4D5-4134-9FD1-090204EAA504}"/>
               </a:ext>
             </a:extLst>
           </p:cNvPr>
@@ -3719,51 +3731,62 @@
           <p:nvPr/>
         </p:nvPicPr>
         <p:blipFill>
-          <a:blip r:embed="rId6"/>
+          <a:blip r:embed="rId6">
+            <a:extLst>
+              <a:ext uri="{28A0092B-C50C-407E-A947-70E740481C1C}">
+                <a14:useLocalDpi xmlns:a14="http://schemas.microsoft.com/office/drawing/2010/main" val="0"/>
+              </a:ext>
+            </a:extLst>
+          </a:blip>
           <a:stretch>
             <a:fillRect/>
           </a:stretch>
         </p:blipFill>
         <p:spPr>
           <a:xfrm>
-            <a:off x="4918126" y="3456264"/>
-            <a:ext cx="1017967" cy="677411"/>
+            <a:off x="2638217" y="1744910"/>
+            <a:ext cx="2609984" cy="4641853"/>
           </a:xfrm>
           <a:prstGeom prst="rect">
             <a:avLst/>
           </a:prstGeom>
         </p:spPr>
       </p:pic>
-      <p:pic>
-        <p:nvPicPr>
-          <p:cNvPr id="12" name="Image 11">
-            <a:extLst>
-              <a:ext uri="{FF2B5EF4-FFF2-40B4-BE49-F238E27FC236}">
-                <a16:creationId xmlns:a16="http://schemas.microsoft.com/office/drawing/2014/main" id="{20DE03B6-4E17-425D-A34B-299C7DCEF7CB}"/>
-              </a:ext>
-            </a:extLst>
-          </p:cNvPr>
-          <p:cNvPicPr>
-            <a:picLocks noChangeAspect="1"/>
-          </p:cNvPicPr>
+      <p:sp>
+        <p:nvSpPr>
+          <p:cNvPr id="13" name="ZoneTexte 12">
+            <a:extLst>
+              <a:ext uri="{FF2B5EF4-FFF2-40B4-BE49-F238E27FC236}">
+                <a16:creationId xmlns:a16="http://schemas.microsoft.com/office/drawing/2014/main" id="{9A8EE668-DB90-4232-8F7C-BBF9B8B4FBCF}"/>
+              </a:ext>
+            </a:extLst>
+          </p:cNvPr>
+          <p:cNvSpPr txBox="1"/>
           <p:nvPr/>
-        </p:nvPicPr>
-        <p:blipFill>
-          <a:blip r:embed="rId6"/>
-          <a:stretch>
-            <a:fillRect/>
-          </a:stretch>
-        </p:blipFill>
-        <p:spPr>
-          <a:xfrm>
-            <a:off x="4900780" y="4183950"/>
-            <a:ext cx="1017967" cy="677411"/>
+        </p:nvSpPr>
+        <p:spPr>
+          <a:xfrm>
+            <a:off x="8810518" y="1744910"/>
+            <a:ext cx="1172381" cy="369332"/>
           </a:xfrm>
           <a:prstGeom prst="rect">
             <a:avLst/>
           </a:prstGeom>
-        </p:spPr>
-      </p:pic>
+          <a:noFill/>
+        </p:spPr>
+        <p:txBody>
+          <a:bodyPr wrap="square" rtlCol="0">
+            <a:spAutoFit/>
+          </a:bodyPr>
+          <a:lstStyle/>
+          <a:p>
+            <a:r>
+              <a:rPr lang="fr-CA" dirty="0"/>
+              <a:t>En cour</a:t>
+            </a:r>
+          </a:p>
+        </p:txBody>
+      </p:sp>
     </p:spTree>
     <p:extLst>
       <p:ext uri="{BB962C8B-B14F-4D97-AF65-F5344CB8AC3E}">
@@ -4144,8 +4167,8 @@
         </p:nvSpPr>
         <p:spPr>
           <a:xfrm>
-            <a:off x="1058351" y="140530"/>
-            <a:ext cx="5518618" cy="461665"/>
+            <a:off x="1058350" y="140530"/>
+            <a:ext cx="9578889" cy="1384995"/>
           </a:xfrm>
           <a:prstGeom prst="rect">
             <a:avLst/>
@@ -4161,6 +4184,12 @@
             <a:r>
               <a:rPr lang="fr-CA" sz="2400" dirty="0"/>
               <a:t>Les événements</a:t>
+            </a:r>
+          </a:p>
+          <a:p>
+            <a:r>
+              <a:rPr lang="fr-CA" sz="2000" dirty="0"/>
+              <a:t>Il y a des alertes, sous forme de pop-up, pour aviser que la commande est terminé ou qu’il y a un problème avec la machine. C’est simplement pour aviser, il n’y a pas d’action à faire sur le site web, il faut aller régler le problème directement à la machine.</a:t>
             </a:r>
           </a:p>
         </p:txBody>
@@ -4282,7 +4311,7 @@
         <p:spPr>
           <a:xfrm>
             <a:off x="1058350" y="140530"/>
-            <a:ext cx="6256849" cy="1077218"/>
+            <a:ext cx="7817202" cy="1077218"/>
           </a:xfrm>
           <a:prstGeom prst="rect">
             <a:avLst/>
@@ -4389,7 +4418,7 @@
         <p:spPr>
           <a:xfrm>
             <a:off x="1665483" y="199253"/>
-            <a:ext cx="5518618" cy="1077218"/>
+            <a:ext cx="7570796" cy="1384995"/>
           </a:xfrm>
           <a:prstGeom prst="rect">
             <a:avLst/>
@@ -4410,7 +4439,7 @@
           <a:p>
             <a:r>
               <a:rPr lang="fr-CA" sz="2000" dirty="0"/>
-              <a:t>Le menu permet de naviguer en les différentes pages et de se déconnecter.</a:t>
+              <a:t>Le menu permet de naviguer en les différentes pages et de se déconnecter. Le menu est accessible a partir de tous les pages sauf la page de connexion. </a:t>
             </a:r>
           </a:p>
         </p:txBody>

</xml_diff>